<commit_message>
Started working on user manual
</commit_message>
<xml_diff>
--- a/docs/laboratoare/AI/prezentare.pptx
+++ b/docs/laboratoare/AI/prezentare.pptx
@@ -4199,6 +4199,13 @@
   <p:clrMapOvr>
     <a:masterClrMapping/>
   </p:clrMapOvr>
+  <p:timing>
+    <p:tnLst>
+      <p:par>
+        <p:cTn id="1" dur="indefinite" restart="never" nodeType="tmRoot"/>
+      </p:par>
+    </p:tnLst>
+  </p:timing>
 </p:sld>
 </file>
 
@@ -4293,6 +4300,13 @@
   <p:clrMapOvr>
     <a:masterClrMapping/>
   </p:clrMapOvr>
+  <p:timing>
+    <p:tnLst>
+      <p:par>
+        <p:cTn id="1" dur="indefinite" restart="never" nodeType="tmRoot"/>
+      </p:par>
+    </p:tnLst>
+  </p:timing>
 </p:sld>
 </file>
 
@@ -4425,6 +4439,13 @@
   <p:clrMapOvr>
     <a:masterClrMapping/>
   </p:clrMapOvr>
+  <p:timing>
+    <p:tnLst>
+      <p:par>
+        <p:cTn id="1" dur="indefinite" restart="never" nodeType="tmRoot"/>
+      </p:par>
+    </p:tnLst>
+  </p:timing>
 </p:sld>
 </file>
 
@@ -4490,7 +4511,7 @@
         </p:blipFill>
         <p:spPr>
           <a:xfrm>
-            <a:off x="810491" y="2632364"/>
+            <a:off x="796636" y="2632364"/>
             <a:ext cx="7894939" cy="3124200"/>
           </a:xfrm>
           <a:prstGeom prst="rect">
@@ -4498,6 +4519,42 @@
           </a:prstGeom>
         </p:spPr>
       </p:pic>
+      <p:sp>
+        <p:nvSpPr>
+          <p:cNvPr id="5" name="TextBox 4"/>
+          <p:cNvSpPr txBox="1"/>
+          <p:nvPr/>
+        </p:nvSpPr>
+        <p:spPr>
+          <a:xfrm>
+            <a:off x="5562600" y="3657600"/>
+            <a:ext cx="838200" cy="338554"/>
+          </a:xfrm>
+          <a:prstGeom prst="rect">
+            <a:avLst/>
+          </a:prstGeom>
+          <a:noFill/>
+        </p:spPr>
+        <p:txBody>
+          <a:bodyPr wrap="square" rtlCol="0">
+            <a:spAutoFit/>
+          </a:bodyPr>
+          <a:lstStyle/>
+          <a:p>
+            <a:r>
+              <a:rPr lang="en-US" sz="1600" smtClean="0">
+                <a:latin typeface="Calibri" pitchFamily="34" charset="0"/>
+                <a:cs typeface="Calibri" pitchFamily="34" charset="0"/>
+              </a:rPr>
+              <a:t>result</a:t>
+            </a:r>
+            <a:endParaRPr lang="en-US" sz="1600">
+              <a:latin typeface="Calibri" pitchFamily="34" charset="0"/>
+              <a:cs typeface="Calibri" pitchFamily="34" charset="0"/>
+            </a:endParaRPr>
+          </a:p>
+        </p:txBody>
+      </p:sp>
     </p:spTree>
     <p:extLst>
       <p:ext uri="{BB962C8B-B14F-4D97-AF65-F5344CB8AC3E}">
@@ -4508,6 +4565,13 @@
   <p:clrMapOvr>
     <a:masterClrMapping/>
   </p:clrMapOvr>
+  <p:timing>
+    <p:tnLst>
+      <p:par>
+        <p:cTn id="1" dur="indefinite" restart="never" nodeType="tmRoot"/>
+      </p:par>
+    </p:tnLst>
+  </p:timing>
 </p:sld>
 </file>
 
@@ -4920,6 +4984,13 @@
   <p:clrMapOvr>
     <a:masterClrMapping/>
   </p:clrMapOvr>
+  <p:timing>
+    <p:tnLst>
+      <p:par>
+        <p:cTn id="1" dur="indefinite" restart="never" nodeType="tmRoot"/>
+      </p:par>
+    </p:tnLst>
+  </p:timing>
 </p:sld>
 </file>
 
@@ -5002,6 +5073,13 @@
   <p:clrMapOvr>
     <a:masterClrMapping/>
   </p:clrMapOvr>
+  <p:timing>
+    <p:tnLst>
+      <p:par>
+        <p:cTn id="1" dur="indefinite" restart="never" nodeType="tmRoot"/>
+      </p:par>
+    </p:tnLst>
+  </p:timing>
 </p:sld>
 </file>
 
@@ -5084,6 +5162,13 @@
   <p:clrMapOvr>
     <a:masterClrMapping/>
   </p:clrMapOvr>
+  <p:timing>
+    <p:tnLst>
+      <p:par>
+        <p:cTn id="1" dur="indefinite" restart="never" nodeType="tmRoot"/>
+      </p:par>
+    </p:tnLst>
+  </p:timing>
 </p:sld>
 </file>
 
@@ -5166,6 +5251,13 @@
   <p:clrMapOvr>
     <a:masterClrMapping/>
   </p:clrMapOvr>
+  <p:timing>
+    <p:tnLst>
+      <p:par>
+        <p:cTn id="1" dur="indefinite" restart="never" nodeType="tmRoot"/>
+      </p:par>
+    </p:tnLst>
+  </p:timing>
 </p:sld>
 </file>
 
@@ -5344,6 +5436,13 @@
   <p:clrMapOvr>
     <a:masterClrMapping/>
   </p:clrMapOvr>
+  <p:timing>
+    <p:tnLst>
+      <p:par>
+        <p:cTn id="1" dur="indefinite" restart="never" nodeType="tmRoot"/>
+      </p:par>
+    </p:tnLst>
+  </p:timing>
 </p:sld>
 </file>
 
@@ -5425,20 +5524,12 @@
               <a:rPr lang="pt-BR"/>
               <a:t>R &gt; 220), (G &gt; 210), (B &gt; 170),</a:t>
             </a:r>
-            <a:r>
-              <a:rPr lang="pt-BR"/>
-              <a:t/>
-            </a:r>
             <a:br>
               <a:rPr lang="pt-BR"/>
             </a:br>
             <a:r>
               <a:rPr lang="pt-BR"/>
-              <a:t>|R − G| ≤ 15, (R&gt;B), (</a:t>
-            </a:r>
-            <a:r>
-              <a:rPr lang="pt-BR"/>
-              <a:t>G&gt;B</a:t>
+              <a:t>|R − G| ≤ 15, (R&gt;B), (G&gt;B</a:t>
             </a:r>
             <a:r>
               <a:rPr lang="pt-BR" smtClean="0"/>
@@ -5467,6 +5558,13 @@
   <p:clrMapOvr>
     <a:masterClrMapping/>
   </p:clrMapOvr>
+  <p:timing>
+    <p:tnLst>
+      <p:par>
+        <p:cTn id="1" dur="indefinite" restart="never" nodeType="tmRoot"/>
+      </p:par>
+    </p:tnLst>
+  </p:timing>
 </p:sld>
 </file>
 
@@ -5579,6 +5677,13 @@
   <p:clrMapOvr>
     <a:masterClrMapping/>
   </p:clrMapOvr>
+  <p:timing>
+    <p:tnLst>
+      <p:par>
+        <p:cTn id="1" dur="indefinite" restart="never" nodeType="tmRoot"/>
+      </p:par>
+    </p:tnLst>
+  </p:timing>
 </p:sld>
 </file>
 
@@ -5726,6 +5831,13 @@
   <p:clrMapOvr>
     <a:masterClrMapping/>
   </p:clrMapOvr>
+  <p:timing>
+    <p:tnLst>
+      <p:par>
+        <p:cTn id="1" dur="indefinite" restart="never" nodeType="tmRoot"/>
+      </p:par>
+    </p:tnLst>
+  </p:timing>
 </p:sld>
 </file>
 
@@ -5850,6 +5962,13 @@
   <p:clrMapOvr>
     <a:masterClrMapping/>
   </p:clrMapOvr>
+  <p:timing>
+    <p:tnLst>
+      <p:par>
+        <p:cTn id="1" dur="indefinite" restart="never" nodeType="tmRoot"/>
+      </p:par>
+    </p:tnLst>
+  </p:timing>
 </p:sld>
 </file>
 
@@ -5997,6 +6116,13 @@
   <p:clrMapOvr>
     <a:masterClrMapping/>
   </p:clrMapOvr>
+  <p:timing>
+    <p:tnLst>
+      <p:par>
+        <p:cTn id="1" dur="indefinite" restart="never" nodeType="tmRoot"/>
+      </p:par>
+    </p:tnLst>
+  </p:timing>
 </p:sld>
 </file>
 

</xml_diff>